<commit_message>
eliminated npm and specified bash
</commit_message>
<xml_diff>
--- a/chirashi.pptx
+++ b/chirashi.pptx
@@ -3512,11 +3512,11 @@
   <p:clrMapOvr>
     <a:masterClrMapping/>
   </p:clrMapOvr>
-  <mc:AlternateContent xmlns:mc="http://schemas.openxmlformats.org/markup-compatibility/2006">
-    <mc:Choice xmlns:p14="http://schemas.microsoft.com/office/powerpoint/2010/main" Requires="p14">
+  <mc:AlternateContent xmlns:mc="http://schemas.openxmlformats.org/markup-compatibility/2006" xmlns:p14="http://schemas.microsoft.com/office/powerpoint/2010/main">
+    <mc:Choice Requires="p14">
       <p:transition spd="slow" p14:dur="2000" advTm="1184"/>
     </mc:Choice>
-    <mc:Fallback>
+    <mc:Fallback xmlns="">
       <p:transition spd="slow" advTm="1184"/>
     </mc:Fallback>
   </mc:AlternateContent>
@@ -3554,7 +3554,7 @@
         </p:nvSpPr>
         <p:spPr>
           <a:xfrm>
-            <a:off x="2105164" y="1068513"/>
+            <a:off x="2105164" y="679941"/>
             <a:ext cx="7981672" cy="1569660"/>
           </a:xfrm>
           <a:prstGeom prst="rect">
@@ -3617,7 +3617,7 @@
         </p:blipFill>
         <p:spPr>
           <a:xfrm>
-            <a:off x="4477285" y="2982717"/>
+            <a:off x="4477285" y="2594145"/>
             <a:ext cx="3237430" cy="3237430"/>
           </a:xfrm>
           <a:prstGeom prst="rect">
@@ -3625,6 +3625,59 @@
           </a:prstGeom>
         </p:spPr>
       </p:pic>
+      <p:sp>
+        <p:nvSpPr>
+          <p:cNvPr id="2" name="TextBox 1">
+            <a:extLst>
+              <a:ext uri="{FF2B5EF4-FFF2-40B4-BE49-F238E27FC236}">
+                <a16:creationId xmlns:a16="http://schemas.microsoft.com/office/drawing/2014/main" id="{CB953487-6880-7E4E-A87B-EB8362080F4B}"/>
+              </a:ext>
+            </a:extLst>
+          </p:cNvPr>
+          <p:cNvSpPr txBox="1"/>
+          <p:nvPr/>
+        </p:nvSpPr>
+        <p:spPr>
+          <a:xfrm>
+            <a:off x="7121894" y="5733952"/>
+            <a:ext cx="5070106" cy="1200329"/>
+          </a:xfrm>
+          <a:prstGeom prst="rect">
+            <a:avLst/>
+          </a:prstGeom>
+          <a:noFill/>
+        </p:spPr>
+        <p:txBody>
+          <a:bodyPr wrap="none" rtlCol="0">
+            <a:spAutoFit/>
+          </a:bodyPr>
+          <a:lstStyle/>
+          <a:p>
+            <a:r>
+              <a:rPr lang="en-US" sz="3600" b="1" dirty="0" err="1"/>
+              <a:t>WiFi</a:t>
+            </a:r>
+            <a:r>
+              <a:rPr lang="en-US" sz="3600" b="1" dirty="0"/>
+              <a:t>: </a:t>
+            </a:r>
+            <a:r>
+              <a:rPr lang="en-US" sz="3600" b="1" dirty="0" err="1"/>
+              <a:t>BcH</a:t>
+            </a:r>
+            <a:r>
+              <a:rPr lang="en-US" sz="3600" b="1" dirty="0"/>
+              <a:t> Guest</a:t>
+            </a:r>
+          </a:p>
+          <a:p>
+            <a:r>
+              <a:rPr lang="en-US" sz="3600" b="1" dirty="0"/>
+              <a:t>PW:   BlockchainHub2016</a:t>
+            </a:r>
+          </a:p>
+        </p:txBody>
+      </p:sp>
     </p:spTree>
     <p:extLst>
       <p:ext uri="{BB962C8B-B14F-4D97-AF65-F5344CB8AC3E}">

</xml_diff>

<commit_message>
updated 20191003 chirashi and receipt
</commit_message>
<xml_diff>
--- a/chirashi.pptx
+++ b/chirashi.pptx
@@ -260,7 +260,7 @@
           <a:p>
             <a:fld id="{4291F35A-A149-6D41-83FC-CDFE93DD8427}" type="datetimeFigureOut">
               <a:rPr lang="en-US" smtClean="0"/>
-              <a:t>9/19/19</a:t>
+              <a:t>10/3/19</a:t>
             </a:fld>
             <a:endParaRPr lang="en-US"/>
           </a:p>
@@ -458,7 +458,7 @@
           <a:p>
             <a:fld id="{4291F35A-A149-6D41-83FC-CDFE93DD8427}" type="datetimeFigureOut">
               <a:rPr lang="en-US" smtClean="0"/>
-              <a:t>9/19/19</a:t>
+              <a:t>10/3/19</a:t>
             </a:fld>
             <a:endParaRPr lang="en-US"/>
           </a:p>
@@ -666,7 +666,7 @@
           <a:p>
             <a:fld id="{4291F35A-A149-6D41-83FC-CDFE93DD8427}" type="datetimeFigureOut">
               <a:rPr lang="en-US" smtClean="0"/>
-              <a:t>9/19/19</a:t>
+              <a:t>10/3/19</a:t>
             </a:fld>
             <a:endParaRPr lang="en-US"/>
           </a:p>
@@ -864,7 +864,7 @@
           <a:p>
             <a:fld id="{4291F35A-A149-6D41-83FC-CDFE93DD8427}" type="datetimeFigureOut">
               <a:rPr lang="en-US" smtClean="0"/>
-              <a:t>9/19/19</a:t>
+              <a:t>10/3/19</a:t>
             </a:fld>
             <a:endParaRPr lang="en-US"/>
           </a:p>
@@ -1139,7 +1139,7 @@
           <a:p>
             <a:fld id="{4291F35A-A149-6D41-83FC-CDFE93DD8427}" type="datetimeFigureOut">
               <a:rPr lang="en-US" smtClean="0"/>
-              <a:t>9/19/19</a:t>
+              <a:t>10/3/19</a:t>
             </a:fld>
             <a:endParaRPr lang="en-US"/>
           </a:p>
@@ -1404,7 +1404,7 @@
           <a:p>
             <a:fld id="{4291F35A-A149-6D41-83FC-CDFE93DD8427}" type="datetimeFigureOut">
               <a:rPr lang="en-US" smtClean="0"/>
-              <a:t>9/19/19</a:t>
+              <a:t>10/3/19</a:t>
             </a:fld>
             <a:endParaRPr lang="en-US"/>
           </a:p>
@@ -1816,7 +1816,7 @@
           <a:p>
             <a:fld id="{4291F35A-A149-6D41-83FC-CDFE93DD8427}" type="datetimeFigureOut">
               <a:rPr lang="en-US" smtClean="0"/>
-              <a:t>9/19/19</a:t>
+              <a:t>10/3/19</a:t>
             </a:fld>
             <a:endParaRPr lang="en-US"/>
           </a:p>
@@ -1957,7 +1957,7 @@
           <a:p>
             <a:fld id="{4291F35A-A149-6D41-83FC-CDFE93DD8427}" type="datetimeFigureOut">
               <a:rPr lang="en-US" smtClean="0"/>
-              <a:t>9/19/19</a:t>
+              <a:t>10/3/19</a:t>
             </a:fld>
             <a:endParaRPr lang="en-US"/>
           </a:p>
@@ -2070,7 +2070,7 @@
           <a:p>
             <a:fld id="{4291F35A-A149-6D41-83FC-CDFE93DD8427}" type="datetimeFigureOut">
               <a:rPr lang="en-US" smtClean="0"/>
-              <a:t>9/19/19</a:t>
+              <a:t>10/3/19</a:t>
             </a:fld>
             <a:endParaRPr lang="en-US"/>
           </a:p>
@@ -2381,7 +2381,7 @@
           <a:p>
             <a:fld id="{4291F35A-A149-6D41-83FC-CDFE93DD8427}" type="datetimeFigureOut">
               <a:rPr lang="en-US" smtClean="0"/>
-              <a:t>9/19/19</a:t>
+              <a:t>10/3/19</a:t>
             </a:fld>
             <a:endParaRPr lang="en-US"/>
           </a:p>
@@ -2669,7 +2669,7 @@
           <a:p>
             <a:fld id="{4291F35A-A149-6D41-83FC-CDFE93DD8427}" type="datetimeFigureOut">
               <a:rPr lang="en-US" smtClean="0"/>
-              <a:t>9/19/19</a:t>
+              <a:t>10/3/19</a:t>
             </a:fld>
             <a:endParaRPr lang="en-US"/>
           </a:p>
@@ -2910,7 +2910,7 @@
           <a:p>
             <a:fld id="{4291F35A-A149-6D41-83FC-CDFE93DD8427}" type="datetimeFigureOut">
               <a:rPr lang="en-US" smtClean="0"/>
-              <a:t>9/19/19</a:t>
+              <a:t>10/3/19</a:t>
             </a:fld>
             <a:endParaRPr lang="en-US"/>
           </a:p>
@@ -3413,7 +3413,7 @@
             </a:r>
             <a:r>
               <a:rPr lang="en-US" altLang="ja-JP" sz="2800" b="1" dirty="0"/>
-              <a:t>1</a:t>
+              <a:t>2</a:t>
             </a:r>
             <a:r>
               <a:rPr lang="ja-JP" altLang="en-US" sz="2800" b="1"/>
@@ -3477,7 +3477,7 @@
             </a:r>
             <a:r>
               <a:rPr lang="en-US" altLang="ja-JP" sz="2400" dirty="0"/>
-              <a:t>500</a:t>
+              <a:t>2,000</a:t>
             </a:r>
             <a:r>
               <a:rPr lang="ja-JP" altLang="en-US" sz="2400"/>
@@ -3554,7 +3554,7 @@
         </p:nvSpPr>
         <p:spPr>
           <a:xfrm>
-            <a:off x="2105164" y="679941"/>
+            <a:off x="2105164" y="222741"/>
             <a:ext cx="7981672" cy="1569660"/>
           </a:xfrm>
           <a:prstGeom prst="rect">
@@ -3586,21 +3586,86 @@
           <a:p>
             <a:pPr algn="ctr"/>
             <a:r>
-              <a:rPr lang="en-US" sz="3200" b="1" dirty="0">
+              <a:rPr lang="en-US" altLang="ja-JP" sz="3200" b="1" dirty="0">
                 <a:hlinkClick r:id="rId2"/>
               </a:rPr>
-              <a:t>https://github.com/zettant/e2e-security-01</a:t>
-            </a:r>
-            <a:endParaRPr lang="en-US" sz="3200" b="1" dirty="0"/>
+              <a:t>https://github.com/zettant/e2e-security-02</a:t>
+            </a:r>
+            <a:endParaRPr lang="en-US" altLang="ja-JP" sz="3200" b="1" dirty="0"/>
+          </a:p>
+        </p:txBody>
+      </p:sp>
+      <p:sp>
+        <p:nvSpPr>
+          <p:cNvPr id="2" name="TextBox 1">
+            <a:extLst>
+              <a:ext uri="{FF2B5EF4-FFF2-40B4-BE49-F238E27FC236}">
+                <a16:creationId xmlns:a16="http://schemas.microsoft.com/office/drawing/2014/main" id="{CB953487-6880-7E4E-A87B-EB8362080F4B}"/>
+              </a:ext>
+            </a:extLst>
+          </p:cNvPr>
+          <p:cNvSpPr txBox="1"/>
+          <p:nvPr/>
+        </p:nvSpPr>
+        <p:spPr>
+          <a:xfrm>
+            <a:off x="5600700" y="5657671"/>
+            <a:ext cx="6591300" cy="1200329"/>
+          </a:xfrm>
+          <a:prstGeom prst="rect">
+            <a:avLst/>
+          </a:prstGeom>
+          <a:noFill/>
+        </p:spPr>
+        <p:txBody>
+          <a:bodyPr wrap="square" rtlCol="0">
+            <a:spAutoFit/>
+          </a:bodyPr>
+          <a:lstStyle/>
+          <a:p>
+            <a:r>
+              <a:rPr lang="en-US" sz="3600" b="1" dirty="0" err="1"/>
+              <a:t>WiFi</a:t>
+            </a:r>
+            <a:r>
+              <a:rPr lang="en-US" sz="3600" b="1" dirty="0"/>
+              <a:t>  </a:t>
+            </a:r>
+            <a:r>
+              <a:rPr lang="ja-JP" altLang="en-US" sz="3600" b="1"/>
+              <a:t>→</a:t>
+            </a:r>
+            <a:r>
+              <a:rPr lang="en-US" altLang="ja-JP" sz="3600" b="1" dirty="0"/>
+              <a:t>  </a:t>
+            </a:r>
+            <a:r>
+              <a:rPr lang="en-US" sz="3600" b="1" dirty="0"/>
+              <a:t>SSID: </a:t>
+            </a:r>
+            <a:r>
+              <a:rPr lang="en-US" sz="3600" b="1" dirty="0" err="1"/>
+              <a:t>BcH</a:t>
+            </a:r>
+            <a:r>
+              <a:rPr lang="en-US" sz="3600" b="1" dirty="0"/>
+              <a:t> Guest</a:t>
+            </a:r>
+          </a:p>
+          <a:p>
+            <a:r>
+              <a:rPr lang="en-US" sz="3600" b="1" dirty="0"/>
+              <a:t>                PW: BlockchainHub2016</a:t>
+            </a:r>
           </a:p>
         </p:txBody>
       </p:sp>
       <p:pic>
         <p:nvPicPr>
-          <p:cNvPr id="5" name="Picture 4">
-            <a:extLst>
-              <a:ext uri="{FF2B5EF4-FFF2-40B4-BE49-F238E27FC236}">
-                <a16:creationId xmlns:a16="http://schemas.microsoft.com/office/drawing/2014/main" id="{645F1C18-6311-9640-A3F7-C44C445F9BDA}"/>
+          <p:cNvPr id="6" name="Picture 5">
+            <a:extLst>
+              <a:ext uri="{FF2B5EF4-FFF2-40B4-BE49-F238E27FC236}">
+                <a16:creationId xmlns:a16="http://schemas.microsoft.com/office/drawing/2014/main" id="{762FA8B6-A860-4043-B958-629F3B569EC7}"/>
               </a:ext>
             </a:extLst>
           </p:cNvPr>
@@ -3617,67 +3682,14 @@
         </p:blipFill>
         <p:spPr>
           <a:xfrm>
-            <a:off x="4477285" y="2594145"/>
-            <a:ext cx="3237430" cy="3237430"/>
+            <a:off x="4107106" y="1736143"/>
+            <a:ext cx="3977787" cy="3977787"/>
           </a:xfrm>
           <a:prstGeom prst="rect">
             <a:avLst/>
           </a:prstGeom>
         </p:spPr>
       </p:pic>
-      <p:sp>
-        <p:nvSpPr>
-          <p:cNvPr id="2" name="TextBox 1">
-            <a:extLst>
-              <a:ext uri="{FF2B5EF4-FFF2-40B4-BE49-F238E27FC236}">
-                <a16:creationId xmlns:a16="http://schemas.microsoft.com/office/drawing/2014/main" id="{CB953487-6880-7E4E-A87B-EB8362080F4B}"/>
-              </a:ext>
-            </a:extLst>
-          </p:cNvPr>
-          <p:cNvSpPr txBox="1"/>
-          <p:nvPr/>
-        </p:nvSpPr>
-        <p:spPr>
-          <a:xfrm>
-            <a:off x="7121894" y="5733952"/>
-            <a:ext cx="5070106" cy="1200329"/>
-          </a:xfrm>
-          <a:prstGeom prst="rect">
-            <a:avLst/>
-          </a:prstGeom>
-          <a:noFill/>
-        </p:spPr>
-        <p:txBody>
-          <a:bodyPr wrap="none" rtlCol="0">
-            <a:spAutoFit/>
-          </a:bodyPr>
-          <a:lstStyle/>
-          <a:p>
-            <a:r>
-              <a:rPr lang="en-US" sz="3600" b="1" dirty="0" err="1"/>
-              <a:t>WiFi</a:t>
-            </a:r>
-            <a:r>
-              <a:rPr lang="en-US" sz="3600" b="1" dirty="0"/>
-              <a:t>: </a:t>
-            </a:r>
-            <a:r>
-              <a:rPr lang="en-US" sz="3600" b="1" dirty="0" err="1"/>
-              <a:t>BcH</a:t>
-            </a:r>
-            <a:r>
-              <a:rPr lang="en-US" sz="3600" b="1" dirty="0"/>
-              <a:t> Guest</a:t>
-            </a:r>
-          </a:p>
-          <a:p>
-            <a:r>
-              <a:rPr lang="en-US" sz="3600" b="1" dirty="0"/>
-              <a:t>PW:   BlockchainHub2016</a:t>
-            </a:r>
-          </a:p>
-        </p:txBody>
-      </p:sp>
     </p:spTree>
     <p:extLst>
       <p:ext uri="{BB962C8B-B14F-4D97-AF65-F5344CB8AC3E}">

</xml_diff>